<commit_message>
Update Practial Prompt Patterns Slides.pptx
</commit_message>
<xml_diff>
--- a/Practial Prompt Patterns Slides.pptx
+++ b/Practial Prompt Patterns Slides.pptx
@@ -5,7 +5,7 @@
     <p:sldMasterId id="2147483648" r:id="rId1"/>
   </p:sldMasterIdLst>
   <p:notesMasterIdLst>
-    <p:notesMasterId r:id="rId22"/>
+    <p:notesMasterId r:id="rId23"/>
   </p:notesMasterIdLst>
   <p:sldIdLst>
     <p:sldId id="256" r:id="rId2"/>
@@ -27,31 +27,29 @@
     <p:sldId id="440" r:id="rId18"/>
     <p:sldId id="441" r:id="rId19"/>
     <p:sldId id="415" r:id="rId20"/>
-    <p:sldId id="427" r:id="rId21"/>
+    <p:sldId id="4690" r:id="rId21"/>
+    <p:sldId id="427" r:id="rId22"/>
   </p:sldIdLst>
   <p:sldSz cx="18288000" cy="10287000"/>
   <p:notesSz cx="6858000" cy="9144000"/>
   <p:embeddedFontLst>
     <p:embeddedFont>
       <p:font typeface="Avenir Next LT Pro" panose="020B0504020202020204" pitchFamily="34" charset="0"/>
-      <p:regular r:id="rId23"/>
-      <p:bold r:id="rId24"/>
-      <p:italic r:id="rId25"/>
-      <p:boldItalic r:id="rId26"/>
+      <p:regular r:id="rId24"/>
+      <p:bold r:id="rId25"/>
+      <p:italic r:id="rId26"/>
+      <p:boldItalic r:id="rId27"/>
     </p:embeddedFont>
     <p:embeddedFont>
       <p:font typeface="Century Gothic" panose="020B0502020202020204" pitchFamily="34" charset="0"/>
-      <p:regular r:id="rId27"/>
-      <p:bold r:id="rId28"/>
-      <p:italic r:id="rId29"/>
-      <p:boldItalic r:id="rId30"/>
+      <p:regular r:id="rId28"/>
+      <p:bold r:id="rId29"/>
+      <p:italic r:id="rId30"/>
+      <p:boldItalic r:id="rId31"/>
     </p:embeddedFont>
     <p:embeddedFont>
       <p:font typeface="Sabon Next LT" panose="02000500000000000000" pitchFamily="2" charset="0"/>
-      <p:regular r:id="rId31"/>
-      <p:bold r:id="rId32"/>
-      <p:italic r:id="rId33"/>
-      <p:boldItalic r:id="rId34"/>
+      <p:regular r:id="rId32"/>
     </p:embeddedFont>
   </p:embeddedFontLst>
   <p:defaultTextStyle>
@@ -12425,6 +12423,114 @@
 </p:notes>
 </file>
 
+<file path=ppt/notesSlides/notesSlide18.xml><?xml version="1.0" encoding="utf-8"?>
+<p:notes xmlns:a="http://schemas.openxmlformats.org/drawingml/2006/main" xmlns:r="http://schemas.openxmlformats.org/officeDocument/2006/relationships" xmlns:p="http://schemas.openxmlformats.org/presentationml/2006/main">
+  <p:cSld>
+    <p:spTree>
+      <p:nvGrpSpPr>
+        <p:cNvPr id="1" name="">
+          <a:extLst>
+            <a:ext uri="{FF2B5EF4-FFF2-40B4-BE49-F238E27FC236}">
+              <a16:creationId xmlns:a16="http://schemas.microsoft.com/office/drawing/2014/main" id="{64509564-3A26-142B-37DC-CC624D225F0C}"/>
+            </a:ext>
+          </a:extLst>
+        </p:cNvPr>
+        <p:cNvGrpSpPr/>
+        <p:nvPr/>
+      </p:nvGrpSpPr>
+      <p:grpSpPr>
+        <a:xfrm>
+          <a:off x="0" y="0"/>
+          <a:ext cx="0" cy="0"/>
+          <a:chOff x="0" y="0"/>
+          <a:chExt cx="0" cy="0"/>
+        </a:xfrm>
+      </p:grpSpPr>
+      <p:sp>
+        <p:nvSpPr>
+          <p:cNvPr id="2" name="Slide Image Placeholder 1">
+            <a:extLst>
+              <a:ext uri="{FF2B5EF4-FFF2-40B4-BE49-F238E27FC236}">
+                <a16:creationId xmlns:a16="http://schemas.microsoft.com/office/drawing/2014/main" id="{47E72110-D423-E8FF-C072-998E3EC6D3F7}"/>
+              </a:ext>
+            </a:extLst>
+          </p:cNvPr>
+          <p:cNvSpPr>
+            <a:spLocks noGrp="1" noRot="1" noChangeAspect="1"/>
+          </p:cNvSpPr>
+          <p:nvPr>
+            <p:ph type="sldImg"/>
+          </p:nvPr>
+        </p:nvSpPr>
+        <p:spPr/>
+      </p:sp>
+      <p:sp>
+        <p:nvSpPr>
+          <p:cNvPr id="3" name="Notes Placeholder 2">
+            <a:extLst>
+              <a:ext uri="{FF2B5EF4-FFF2-40B4-BE49-F238E27FC236}">
+                <a16:creationId xmlns:a16="http://schemas.microsoft.com/office/drawing/2014/main" id="{8768F82F-FE69-B865-548C-5972A7617DA4}"/>
+              </a:ext>
+            </a:extLst>
+          </p:cNvPr>
+          <p:cNvSpPr>
+            <a:spLocks noGrp="1"/>
+          </p:cNvSpPr>
+          <p:nvPr>
+            <p:ph type="body" idx="1"/>
+          </p:nvPr>
+        </p:nvSpPr>
+        <p:spPr/>
+        <p:txBody>
+          <a:bodyPr/>
+          <a:lstStyle/>
+          <a:p>
+            <a:endParaRPr lang="en-US" sz="1200" dirty="0"/>
+          </a:p>
+        </p:txBody>
+      </p:sp>
+      <p:sp>
+        <p:nvSpPr>
+          <p:cNvPr id="4" name="Slide Number Placeholder 3">
+            <a:extLst>
+              <a:ext uri="{FF2B5EF4-FFF2-40B4-BE49-F238E27FC236}">
+                <a16:creationId xmlns:a16="http://schemas.microsoft.com/office/drawing/2014/main" id="{53F3DD61-CFDD-3EE8-C03F-C63A4A6E1F56}"/>
+              </a:ext>
+            </a:extLst>
+          </p:cNvPr>
+          <p:cNvSpPr>
+            <a:spLocks noGrp="1"/>
+          </p:cNvSpPr>
+          <p:nvPr>
+            <p:ph type="sldNum" sz="quarter" idx="5"/>
+          </p:nvPr>
+        </p:nvSpPr>
+        <p:spPr/>
+        <p:txBody>
+          <a:bodyPr/>
+          <a:lstStyle/>
+          <a:p>
+            <a:fld id="{FFB500C5-13F7-48FC-8160-C29AECF6C602}" type="slidenum">
+              <a:rPr lang="en-US" smtClean="0"/>
+              <a:t>20</a:t>
+            </a:fld>
+            <a:endParaRPr lang="en-US"/>
+          </a:p>
+        </p:txBody>
+      </p:sp>
+    </p:spTree>
+    <p:extLst>
+      <p:ext uri="{BB962C8B-B14F-4D97-AF65-F5344CB8AC3E}">
+        <p14:creationId xmlns:p14="http://schemas.microsoft.com/office/powerpoint/2010/main" val="1500380785"/>
+      </p:ext>
+    </p:extLst>
+  </p:cSld>
+  <p:clrMapOvr>
+    <a:masterClrMapping/>
+  </p:clrMapOvr>
+</p:notes>
+</file>
+
 <file path=ppt/notesSlides/notesSlide2.xml><?xml version="1.0" encoding="utf-8"?>
 <p:notes xmlns:a="http://schemas.openxmlformats.org/drawingml/2006/main" xmlns:r="http://schemas.openxmlformats.org/officeDocument/2006/relationships" xmlns:p="http://schemas.openxmlformats.org/presentationml/2006/main">
   <p:cSld>
@@ -19724,6 +19830,207 @@
 </file>
 
 <file path=ppt/slides/slide20.xml><?xml version="1.0" encoding="utf-8"?>
+<p:sld xmlns:a="http://schemas.openxmlformats.org/drawingml/2006/main" xmlns:r="http://schemas.openxmlformats.org/officeDocument/2006/relationships" xmlns:p="http://schemas.openxmlformats.org/presentationml/2006/main">
+  <p:cSld>
+    <p:spTree>
+      <p:nvGrpSpPr>
+        <p:cNvPr id="1" name="">
+          <a:extLst>
+            <a:ext uri="{FF2B5EF4-FFF2-40B4-BE49-F238E27FC236}">
+              <a16:creationId xmlns:a16="http://schemas.microsoft.com/office/drawing/2014/main" id="{B7A3074D-0C6D-136F-F815-5C7ED6CD4A3C}"/>
+            </a:ext>
+          </a:extLst>
+        </p:cNvPr>
+        <p:cNvGrpSpPr/>
+        <p:nvPr/>
+      </p:nvGrpSpPr>
+      <p:grpSpPr>
+        <a:xfrm>
+          <a:off x="0" y="0"/>
+          <a:ext cx="0" cy="0"/>
+          <a:chOff x="0" y="0"/>
+          <a:chExt cx="0" cy="0"/>
+        </a:xfrm>
+      </p:grpSpPr>
+      <p:sp>
+        <p:nvSpPr>
+          <p:cNvPr id="11" name="TextBox 10">
+            <a:extLst>
+              <a:ext uri="{FF2B5EF4-FFF2-40B4-BE49-F238E27FC236}">
+                <a16:creationId xmlns:a16="http://schemas.microsoft.com/office/drawing/2014/main" id="{65F8CF44-ABC3-1CC6-D000-73572FAFFF87}"/>
+              </a:ext>
+            </a:extLst>
+          </p:cNvPr>
+          <p:cNvSpPr txBox="1"/>
+          <p:nvPr/>
+        </p:nvSpPr>
+        <p:spPr>
+          <a:xfrm>
+            <a:off x="520861" y="170082"/>
+            <a:ext cx="16928939" cy="1107996"/>
+          </a:xfrm>
+          <a:prstGeom prst="rect">
+            <a:avLst/>
+          </a:prstGeom>
+          <a:noFill/>
+        </p:spPr>
+        <p:txBody>
+          <a:bodyPr wrap="square" rtlCol="0">
+            <a:spAutoFit/>
+          </a:bodyPr>
+          <a:lstStyle/>
+          <a:p>
+            <a:r>
+              <a:rPr lang="en-US" sz="6600" dirty="0">
+                <a:latin typeface="Aliens &amp; cows" panose="00000500000000000000" pitchFamily="2" charset="0"/>
+              </a:rPr>
+              <a:t>Next steps</a:t>
+            </a:r>
+          </a:p>
+        </p:txBody>
+      </p:sp>
+      <p:sp>
+        <p:nvSpPr>
+          <p:cNvPr id="3" name="TextBox 2">
+            <a:extLst>
+              <a:ext uri="{FF2B5EF4-FFF2-40B4-BE49-F238E27FC236}">
+                <a16:creationId xmlns:a16="http://schemas.microsoft.com/office/drawing/2014/main" id="{F6C48BEE-61FA-27EA-C9DC-013629EF6271}"/>
+              </a:ext>
+            </a:extLst>
+          </p:cNvPr>
+          <p:cNvSpPr txBox="1"/>
+          <p:nvPr/>
+        </p:nvSpPr>
+        <p:spPr>
+          <a:xfrm>
+            <a:off x="762000" y="2124153"/>
+            <a:ext cx="9385139" cy="3785652"/>
+          </a:xfrm>
+          <a:prstGeom prst="rect">
+            <a:avLst/>
+          </a:prstGeom>
+          <a:noFill/>
+        </p:spPr>
+        <p:txBody>
+          <a:bodyPr wrap="square" rtlCol="0">
+            <a:spAutoFit/>
+          </a:bodyPr>
+          <a:lstStyle/>
+          <a:p>
+            <a:pPr marL="914400" indent="-914400">
+              <a:buClr>
+                <a:srgbClr val="CF3338"/>
+              </a:buClr>
+              <a:buFont typeface="+mj-lt"/>
+              <a:buAutoNum type="arabicPeriod"/>
+            </a:pPr>
+            <a:r>
+              <a:rPr lang="en-US" sz="4800" dirty="0">
+                <a:solidFill>
+                  <a:srgbClr val="707070"/>
+                </a:solidFill>
+                <a:latin typeface="Pragmatica" panose="020B0403040502020204" pitchFamily="34" charset="0"/>
+              </a:rPr>
+              <a:t>Downloads stay up at the repo</a:t>
+            </a:r>
+          </a:p>
+          <a:p>
+            <a:pPr marL="914400" indent="-914400">
+              <a:buClr>
+                <a:srgbClr val="CF3338"/>
+              </a:buClr>
+              <a:buFont typeface="+mj-lt"/>
+              <a:buAutoNum type="arabicPeriod"/>
+            </a:pPr>
+            <a:r>
+              <a:rPr lang="en-US" sz="4800" dirty="0">
+                <a:solidFill>
+                  <a:srgbClr val="707070"/>
+                </a:solidFill>
+                <a:latin typeface="Pragmatica" panose="020B0403040502020204" pitchFamily="34" charset="0"/>
+              </a:rPr>
+              <a:t>Recording will be up at membership</a:t>
+            </a:r>
+          </a:p>
+          <a:p>
+            <a:pPr marL="1371600" lvl="1" indent="-914400">
+              <a:buClr>
+                <a:srgbClr val="CF3338"/>
+              </a:buClr>
+              <a:buFont typeface="Arial" panose="020B0604020202020204" pitchFamily="34" charset="0"/>
+              <a:buChar char="•"/>
+            </a:pPr>
+            <a:r>
+              <a:rPr lang="en-US" sz="4800" dirty="0">
+                <a:solidFill>
+                  <a:srgbClr val="707070"/>
+                </a:solidFill>
+                <a:latin typeface="Pragmatica" panose="020B0403040502020204" pitchFamily="34" charset="0"/>
+              </a:rPr>
+              <a:t>Your fee today counts as first </a:t>
+            </a:r>
+            <a:r>
+              <a:rPr lang="en-US" sz="4800">
+                <a:solidFill>
+                  <a:srgbClr val="707070"/>
+                </a:solidFill>
+                <a:latin typeface="Pragmatica" panose="020B0403040502020204" pitchFamily="34" charset="0"/>
+              </a:rPr>
+              <a:t>month credit</a:t>
+            </a:r>
+          </a:p>
+        </p:txBody>
+      </p:sp>
+      <p:pic>
+        <p:nvPicPr>
+          <p:cNvPr id="15" name="Picture 14" descr="A close up of a sign&#10;&#10;Description automatically generated">
+            <a:extLst>
+              <a:ext uri="{FF2B5EF4-FFF2-40B4-BE49-F238E27FC236}">
+                <a16:creationId xmlns:a16="http://schemas.microsoft.com/office/drawing/2014/main" id="{E9F1D10D-6F22-7120-D5A7-651E590A04B8}"/>
+              </a:ext>
+            </a:extLst>
+          </p:cNvPr>
+          <p:cNvPicPr>
+            <a:picLocks noChangeAspect="1"/>
+          </p:cNvPicPr>
+          <p:nvPr/>
+        </p:nvPicPr>
+        <p:blipFill>
+          <a:blip r:embed="rId3">
+            <a:extLst>
+              <a:ext uri="{28A0092B-C50C-407E-A947-70E740481C1C}">
+                <a14:useLocalDpi xmlns:a14="http://schemas.microsoft.com/office/drawing/2010/main" val="0"/>
+              </a:ext>
+            </a:extLst>
+          </a:blip>
+          <a:stretch>
+            <a:fillRect/>
+          </a:stretch>
+        </p:blipFill>
+        <p:spPr>
+          <a:xfrm>
+            <a:off x="16341036" y="8058429"/>
+            <a:ext cx="1942857" cy="2228571"/>
+          </a:xfrm>
+          <a:prstGeom prst="rect">
+            <a:avLst/>
+          </a:prstGeom>
+        </p:spPr>
+      </p:pic>
+    </p:spTree>
+    <p:extLst>
+      <p:ext uri="{BB962C8B-B14F-4D97-AF65-F5344CB8AC3E}">
+        <p14:creationId xmlns:p14="http://schemas.microsoft.com/office/powerpoint/2010/main" val="275518288"/>
+      </p:ext>
+    </p:extLst>
+  </p:cSld>
+  <p:clrMapOvr>
+    <a:masterClrMapping/>
+  </p:clrMapOvr>
+</p:sld>
+</file>
+
+<file path=ppt/slides/slide21.xml><?xml version="1.0" encoding="utf-8"?>
 <p:sld xmlns:a="http://schemas.openxmlformats.org/drawingml/2006/main" xmlns:r="http://schemas.openxmlformats.org/officeDocument/2006/relationships" xmlns:p="http://schemas.openxmlformats.org/presentationml/2006/main">
   <p:cSld>
     <p:spTree>

</xml_diff>